<commit_message>
finished company visit section
</commit_message>
<xml_diff>
--- a/Groep-21_Presentatie.pptx
+++ b/Groep-21_Presentatie.pptx
@@ -13,6 +13,7 @@
     <p:sldId id="261" r:id="rId7"/>
     <p:sldId id="262" r:id="rId8"/>
     <p:sldId id="263" r:id="rId9"/>
+    <p:sldId id="264" r:id="rId10"/>
   </p:sldIdLst>
   <p:sldSz cx="12192000" cy="6858000"/>
   <p:notesSz cx="6858000" cy="9144000"/>
@@ -8442,7 +8443,64 @@
           <a:bodyPr/>
           <a:lstStyle/>
           <a:p>
-            <a:endParaRPr lang="nl-BE"/>
+            <a:r>
+              <a:rPr lang="nl-BE" dirty="0"/>
+              <a:t>ICTS KU Leuven</a:t>
+            </a:r>
+          </a:p>
+          <a:p>
+            <a:r>
+              <a:rPr lang="nl-BE" dirty="0" err="1"/>
+              <a:t>Easi</a:t>
+            </a:r>
+            <a:endParaRPr lang="nl-BE" dirty="0"/>
+          </a:p>
+          <a:p>
+            <a:r>
+              <a:rPr lang="nl-BE" dirty="0" err="1"/>
+              <a:t>Ausy</a:t>
+            </a:r>
+            <a:r>
+              <a:rPr lang="nl-BE" dirty="0"/>
+              <a:t> Belgium</a:t>
+            </a:r>
+          </a:p>
+          <a:p>
+            <a:r>
+              <a:rPr lang="nl-BE" dirty="0" err="1"/>
+              <a:t>Inetum</a:t>
+            </a:r>
+            <a:r>
+              <a:rPr lang="nl-BE" dirty="0"/>
+              <a:t>-Realdolmen</a:t>
+            </a:r>
+          </a:p>
+          <a:p>
+            <a:r>
+              <a:rPr lang="nl-BE" dirty="0"/>
+              <a:t>Tom </a:t>
+            </a:r>
+            <a:r>
+              <a:rPr lang="nl-BE" dirty="0" err="1"/>
+              <a:t>Tom</a:t>
+            </a:r>
+            <a:r>
+              <a:rPr lang="nl-BE" dirty="0"/>
+              <a:t> NV Belgium</a:t>
+            </a:r>
+          </a:p>
+          <a:p>
+            <a:r>
+              <a:rPr lang="nl-BE" dirty="0"/>
+              <a:t>Vlaamse Overheid (Dep. Financiën | Afd. BOBFO)</a:t>
+            </a:r>
+          </a:p>
+          <a:p>
+            <a:r>
+              <a:rPr lang="nl-BE" dirty="0" err="1"/>
+              <a:t>Unlocked</a:t>
+            </a:r>
+            <a:endParaRPr lang="nl-BE" dirty="0"/>
           </a:p>
         </p:txBody>
       </p:sp>
@@ -9034,6 +9092,106 @@
     <p:extLst>
       <p:ext uri="{BB962C8B-B14F-4D97-AF65-F5344CB8AC3E}">
         <p14:creationId xmlns:p14="http://schemas.microsoft.com/office/powerpoint/2010/main" val="3462231248"/>
+      </p:ext>
+    </p:extLst>
+  </p:cSld>
+  <p:clrMapOvr>
+    <a:masterClrMapping/>
+  </p:clrMapOvr>
+</p:sld>
+</file>
+
+<file path=ppt/slides/slide9.xml><?xml version="1.0" encoding="utf-8"?>
+<p:sld xmlns:a="http://schemas.openxmlformats.org/drawingml/2006/main" xmlns:r="http://schemas.openxmlformats.org/officeDocument/2006/relationships" xmlns:p="http://schemas.openxmlformats.org/presentationml/2006/main">
+  <p:cSld>
+    <p:spTree>
+      <p:nvGrpSpPr>
+        <p:cNvPr id="1" name=""/>
+        <p:cNvGrpSpPr/>
+        <p:nvPr/>
+      </p:nvGrpSpPr>
+      <p:grpSpPr>
+        <a:xfrm>
+          <a:off x="0" y="0"/>
+          <a:ext cx="0" cy="0"/>
+          <a:chOff x="0" y="0"/>
+          <a:chExt cx="0" cy="0"/>
+        </a:xfrm>
+      </p:grpSpPr>
+      <p:sp>
+        <p:nvSpPr>
+          <p:cNvPr id="2" name="Titel 1">
+            <a:extLst>
+              <a:ext uri="{FF2B5EF4-FFF2-40B4-BE49-F238E27FC236}">
+                <a16:creationId xmlns:a16="http://schemas.microsoft.com/office/drawing/2014/main" id="{FCCD4F07-5794-C3AD-0643-349A210C9BDF}"/>
+              </a:ext>
+            </a:extLst>
+          </p:cNvPr>
+          <p:cNvSpPr>
+            <a:spLocks noGrp="1"/>
+          </p:cNvSpPr>
+          <p:nvPr>
+            <p:ph type="ctrTitle"/>
+          </p:nvPr>
+        </p:nvSpPr>
+        <p:spPr>
+          <a:xfrm>
+            <a:off x="4762500" y="2647949"/>
+            <a:ext cx="2487156" cy="1039729"/>
+          </a:xfrm>
+        </p:spPr>
+        <p:txBody>
+          <a:bodyPr/>
+          <a:lstStyle/>
+          <a:p>
+            <a:r>
+              <a:rPr lang="nl-BE" sz="6600" dirty="0"/>
+              <a:t>EINDE</a:t>
+            </a:r>
+          </a:p>
+        </p:txBody>
+      </p:sp>
+      <p:sp>
+        <p:nvSpPr>
+          <p:cNvPr id="3" name="Ondertitel 2">
+            <a:extLst>
+              <a:ext uri="{FF2B5EF4-FFF2-40B4-BE49-F238E27FC236}">
+                <a16:creationId xmlns:a16="http://schemas.microsoft.com/office/drawing/2014/main" id="{A9420442-BFC4-97A9-5D77-67EDB3D86D71}"/>
+              </a:ext>
+            </a:extLst>
+          </p:cNvPr>
+          <p:cNvSpPr>
+            <a:spLocks noGrp="1"/>
+          </p:cNvSpPr>
+          <p:nvPr>
+            <p:ph type="subTitle" idx="1"/>
+          </p:nvPr>
+        </p:nvSpPr>
+        <p:spPr>
+          <a:xfrm>
+            <a:off x="4328547" y="3735471"/>
+            <a:ext cx="3534906" cy="381161"/>
+          </a:xfrm>
+        </p:spPr>
+        <p:txBody>
+          <a:bodyPr/>
+          <a:lstStyle/>
+          <a:p>
+            <a:r>
+              <a:rPr lang="nl-BE" dirty="0" err="1"/>
+              <a:t>Dankuwel</a:t>
+            </a:r>
+            <a:r>
+              <a:rPr lang="nl-BE" dirty="0"/>
+              <a:t> voor het luisteren</a:t>
+            </a:r>
+          </a:p>
+        </p:txBody>
+      </p:sp>
+    </p:spTree>
+    <p:extLst>
+      <p:ext uri="{BB962C8B-B14F-4D97-AF65-F5344CB8AC3E}">
+        <p14:creationId xmlns:p14="http://schemas.microsoft.com/office/powerpoint/2010/main" val="1245348075"/>
       </p:ext>
     </p:extLst>
   </p:cSld>

</xml_diff>

<commit_message>
Slide van bezochte bedrijven en geinterviewde professionals aangepast
</commit_message>
<xml_diff>
--- a/Groep-21_Presentatie.pptx
+++ b/Groep-21_Presentatie.pptx
@@ -7824,8 +7824,8 @@
         </p:nvSpPr>
         <p:spPr>
           <a:xfrm>
-            <a:off x="330200" y="4490920"/>
-            <a:ext cx="7943850" cy="1117687"/>
+            <a:off x="1803400" y="4503620"/>
+            <a:ext cx="9829800" cy="1117687"/>
           </a:xfrm>
         </p:spPr>
         <p:txBody>
@@ -7880,143 +7880,6 @@
               <a:t>IT-Industry Discovery</a:t>
             </a:r>
             <a:endParaRPr lang="nl-NL" sz="5400" dirty="0"/>
-          </a:p>
-        </p:txBody>
-      </p:sp>
-      <p:sp>
-        <p:nvSpPr>
-          <p:cNvPr id="5" name="Tekstvak 4">
-            <a:extLst>
-              <a:ext uri="{FF2B5EF4-FFF2-40B4-BE49-F238E27FC236}">
-                <a16:creationId xmlns:a16="http://schemas.microsoft.com/office/drawing/2014/main" id="{E1FFF543-A84C-6658-E626-55EAF9CA417B}"/>
-              </a:ext>
-            </a:extLst>
-          </p:cNvPr>
-          <p:cNvSpPr txBox="1"/>
-          <p:nvPr/>
-        </p:nvSpPr>
-        <p:spPr>
-          <a:xfrm>
-            <a:off x="9014847" y="4490920"/>
-            <a:ext cx="1771650" cy="1600438"/>
-          </a:xfrm>
-          <a:prstGeom prst="rect">
-            <a:avLst/>
-          </a:prstGeom>
-          <a:noFill/>
-        </p:spPr>
-        <p:txBody>
-          <a:bodyPr wrap="square" rtlCol="0">
-            <a:spAutoFit/>
-          </a:bodyPr>
-          <a:lstStyle/>
-          <a:p>
-            <a:r>
-              <a:rPr lang="en-US" sz="1400" dirty="0"/>
-              <a:t>Ben Blondeel</a:t>
-            </a:r>
-          </a:p>
-          <a:p>
-            <a:r>
-              <a:rPr lang="en-US" sz="1400" dirty="0"/>
-              <a:t>Joeri De Belder</a:t>
-            </a:r>
-          </a:p>
-          <a:p>
-            <a:r>
-              <a:rPr lang="en-US" sz="1400" dirty="0"/>
-              <a:t>Robby Gr</a:t>
-            </a:r>
-            <a:r>
-              <a:rPr lang="nl-NL" sz="1400" dirty="0"/>
-              <a:t>â</a:t>
-            </a:r>
-            <a:r>
-              <a:rPr lang="en-US" sz="1400" dirty="0" err="1"/>
-              <a:t>ces</a:t>
-            </a:r>
-            <a:endParaRPr lang="en-US" sz="1400" dirty="0"/>
-          </a:p>
-          <a:p>
-            <a:r>
-              <a:rPr lang="en-US" sz="1400" dirty="0"/>
-              <a:t>Volkert Brusche</a:t>
-            </a:r>
-          </a:p>
-          <a:p>
-            <a:r>
-              <a:rPr lang="en-US" sz="1400" dirty="0"/>
-              <a:t>Lowie Vandezande</a:t>
-            </a:r>
-          </a:p>
-          <a:p>
-            <a:r>
-              <a:rPr lang="en-US" sz="1400" dirty="0"/>
-              <a:t>Jef Vandezande</a:t>
-            </a:r>
-          </a:p>
-          <a:p>
-            <a:r>
-              <a:rPr lang="en-US" sz="1400" dirty="0"/>
-              <a:t>Arman Macuncu</a:t>
-            </a:r>
-          </a:p>
-        </p:txBody>
-      </p:sp>
-      <p:sp>
-        <p:nvSpPr>
-          <p:cNvPr id="6" name="Tekstvak 5">
-            <a:extLst>
-              <a:ext uri="{FF2B5EF4-FFF2-40B4-BE49-F238E27FC236}">
-                <a16:creationId xmlns:a16="http://schemas.microsoft.com/office/drawing/2014/main" id="{91146220-2080-1F79-3DA7-97EF38F260ED}"/>
-              </a:ext>
-            </a:extLst>
-          </p:cNvPr>
-          <p:cNvSpPr txBox="1"/>
-          <p:nvPr/>
-        </p:nvSpPr>
-        <p:spPr>
-          <a:xfrm>
-            <a:off x="10560050" y="4490920"/>
-            <a:ext cx="1631950" cy="738664"/>
-          </a:xfrm>
-          <a:prstGeom prst="rect">
-            <a:avLst/>
-          </a:prstGeom>
-          <a:noFill/>
-        </p:spPr>
-        <p:txBody>
-          <a:bodyPr wrap="square" rtlCol="0">
-            <a:spAutoFit/>
-          </a:bodyPr>
-          <a:lstStyle/>
-          <a:p>
-            <a:r>
-              <a:rPr lang="en-US" sz="1400" dirty="0" err="1"/>
-              <a:t>Bastiaan</a:t>
-            </a:r>
-            <a:r>
-              <a:rPr lang="en-US" sz="1400" dirty="0"/>
-              <a:t> </a:t>
-            </a:r>
-            <a:r>
-              <a:rPr lang="en-US" sz="1400" dirty="0" err="1"/>
-              <a:t>Aardema</a:t>
-            </a:r>
-            <a:endParaRPr lang="en-US" sz="1400" dirty="0"/>
-          </a:p>
-          <a:p>
-            <a:r>
-              <a:rPr lang="en-US" sz="1400" dirty="0" err="1"/>
-              <a:t>Gis</a:t>
-            </a:r>
-            <a:endParaRPr lang="en-US" sz="1400" dirty="0"/>
-          </a:p>
-          <a:p>
-            <a:r>
-              <a:rPr lang="en-US" sz="1400" dirty="0"/>
-              <a:t>Abe</a:t>
-            </a:r>
           </a:p>
         </p:txBody>
       </p:sp>
@@ -8540,6 +8403,213 @@
           </a:prstGeom>
         </p:spPr>
       </p:pic>
+      <p:pic>
+        <p:nvPicPr>
+          <p:cNvPr id="20" name="Afbeelding 19" descr="Afbeelding met tekst&#10;&#10;Automatisch gegenereerde beschrijving">
+            <a:extLst>
+              <a:ext uri="{FF2B5EF4-FFF2-40B4-BE49-F238E27FC236}">
+                <a16:creationId xmlns:a16="http://schemas.microsoft.com/office/drawing/2014/main" id="{2067BFC4-FB7D-1EB0-B299-CE4EA057792A}"/>
+              </a:ext>
+            </a:extLst>
+          </p:cNvPr>
+          <p:cNvPicPr>
+            <a:picLocks noChangeAspect="1"/>
+          </p:cNvPicPr>
+          <p:nvPr/>
+        </p:nvPicPr>
+        <p:blipFill>
+          <a:blip r:embed="rId3">
+            <a:extLst>
+              <a:ext uri="{BEBA8EAE-BF5A-486C-A8C5-ECC9F3942E4B}">
+                <a14:imgProps xmlns:a14="http://schemas.microsoft.com/office/drawing/2010/main">
+                  <a14:imgLayer r:embed="rId4">
+                    <a14:imgEffect>
+                      <a14:brightnessContrast bright="-20000" contrast="40000"/>
+                    </a14:imgEffect>
+                  </a14:imgLayer>
+                </a14:imgProps>
+              </a:ext>
+              <a:ext uri="{28A0092B-C50C-407E-A947-70E740481C1C}">
+                <a14:useLocalDpi xmlns:a14="http://schemas.microsoft.com/office/drawing/2010/main" val="0"/>
+              </a:ext>
+            </a:extLst>
+          </a:blip>
+          <a:stretch>
+            <a:fillRect/>
+          </a:stretch>
+        </p:blipFill>
+        <p:spPr>
+          <a:xfrm>
+            <a:off x="8474896" y="2652129"/>
+            <a:ext cx="3938489" cy="1689371"/>
+          </a:xfrm>
+          <a:prstGeom prst="rect">
+            <a:avLst/>
+          </a:prstGeom>
+        </p:spPr>
+      </p:pic>
+      <p:pic>
+        <p:nvPicPr>
+          <p:cNvPr id="21" name="Afbeelding 20">
+            <a:extLst>
+              <a:ext uri="{FF2B5EF4-FFF2-40B4-BE49-F238E27FC236}">
+                <a16:creationId xmlns:a16="http://schemas.microsoft.com/office/drawing/2014/main" id="{92DF41BE-E8AE-BA8F-C5E9-D4FD948C4674}"/>
+              </a:ext>
+            </a:extLst>
+          </p:cNvPr>
+          <p:cNvPicPr>
+            <a:picLocks noChangeAspect="1"/>
+          </p:cNvPicPr>
+          <p:nvPr/>
+        </p:nvPicPr>
+        <p:blipFill>
+          <a:blip r:embed="rId5">
+            <a:extLst>
+              <a:ext uri="{BEBA8EAE-BF5A-486C-A8C5-ECC9F3942E4B}">
+                <a14:imgProps xmlns:a14="http://schemas.microsoft.com/office/drawing/2010/main">
+                  <a14:imgLayer r:embed="rId6">
+                    <a14:imgEffect>
+                      <a14:brightnessContrast bright="-40000" contrast="40000"/>
+                    </a14:imgEffect>
+                  </a14:imgLayer>
+                </a14:imgProps>
+              </a:ext>
+              <a:ext uri="{28A0092B-C50C-407E-A947-70E740481C1C}">
+                <a14:useLocalDpi xmlns:a14="http://schemas.microsoft.com/office/drawing/2010/main" val="0"/>
+              </a:ext>
+            </a:extLst>
+          </a:blip>
+          <a:stretch>
+            <a:fillRect/>
+          </a:stretch>
+        </p:blipFill>
+        <p:spPr>
+          <a:xfrm>
+            <a:off x="9489080" y="2228340"/>
+            <a:ext cx="1765955" cy="615529"/>
+          </a:xfrm>
+          <a:prstGeom prst="rect">
+            <a:avLst/>
+          </a:prstGeom>
+        </p:spPr>
+      </p:pic>
+      <p:pic>
+        <p:nvPicPr>
+          <p:cNvPr id="22" name="Afbeelding 21">
+            <a:extLst>
+              <a:ext uri="{FF2B5EF4-FFF2-40B4-BE49-F238E27FC236}">
+                <a16:creationId xmlns:a16="http://schemas.microsoft.com/office/drawing/2014/main" id="{661AEC89-6121-486B-A755-9A8D9EE5FD23}"/>
+              </a:ext>
+            </a:extLst>
+          </p:cNvPr>
+          <p:cNvPicPr>
+            <a:picLocks noChangeAspect="1"/>
+          </p:cNvPicPr>
+          <p:nvPr/>
+        </p:nvPicPr>
+        <p:blipFill>
+          <a:blip r:embed="rId7">
+            <a:extLst>
+              <a:ext uri="{28A0092B-C50C-407E-A947-70E740481C1C}">
+                <a14:useLocalDpi xmlns:a14="http://schemas.microsoft.com/office/drawing/2010/main" val="0"/>
+              </a:ext>
+            </a:extLst>
+          </a:blip>
+          <a:stretch>
+            <a:fillRect/>
+          </a:stretch>
+        </p:blipFill>
+        <p:spPr>
+          <a:xfrm>
+            <a:off x="8680727" y="4216672"/>
+            <a:ext cx="3226909" cy="597345"/>
+          </a:xfrm>
+          <a:prstGeom prst="rect">
+            <a:avLst/>
+          </a:prstGeom>
+        </p:spPr>
+      </p:pic>
+      <p:pic>
+        <p:nvPicPr>
+          <p:cNvPr id="24" name="Afbeelding 23" descr="Afbeelding met tekst&#10;&#10;Automatisch gegenereerde beschrijving">
+            <a:extLst>
+              <a:ext uri="{FF2B5EF4-FFF2-40B4-BE49-F238E27FC236}">
+                <a16:creationId xmlns:a16="http://schemas.microsoft.com/office/drawing/2014/main" id="{94EE60E0-7F1C-60A5-3A3B-BFC801391BA6}"/>
+              </a:ext>
+            </a:extLst>
+          </p:cNvPr>
+          <p:cNvPicPr>
+            <a:picLocks noChangeAspect="1"/>
+          </p:cNvPicPr>
+          <p:nvPr/>
+        </p:nvPicPr>
+        <p:blipFill>
+          <a:blip r:embed="rId8">
+            <a:extLst>
+              <a:ext uri="{28A0092B-C50C-407E-A947-70E740481C1C}">
+                <a14:useLocalDpi xmlns:a14="http://schemas.microsoft.com/office/drawing/2010/main" val="0"/>
+              </a:ext>
+            </a:extLst>
+          </a:blip>
+          <a:stretch>
+            <a:fillRect/>
+          </a:stretch>
+        </p:blipFill>
+        <p:spPr>
+          <a:xfrm>
+            <a:off x="8539825" y="4905121"/>
+            <a:ext cx="3508714" cy="738016"/>
+          </a:xfrm>
+          <a:prstGeom prst="rect">
+            <a:avLst/>
+          </a:prstGeom>
+        </p:spPr>
+      </p:pic>
+      <p:pic>
+        <p:nvPicPr>
+          <p:cNvPr id="25" name="Afbeelding 24" descr="Afbeelding met tekst, teken&#10;&#10;Automatisch gegenereerde beschrijving">
+            <a:extLst>
+              <a:ext uri="{FF2B5EF4-FFF2-40B4-BE49-F238E27FC236}">
+                <a16:creationId xmlns:a16="http://schemas.microsoft.com/office/drawing/2014/main" id="{B52BCB4B-3612-E511-FD10-6C62577F2CB4}"/>
+              </a:ext>
+            </a:extLst>
+          </p:cNvPr>
+          <p:cNvPicPr>
+            <a:picLocks noChangeAspect="1"/>
+          </p:cNvPicPr>
+          <p:nvPr/>
+        </p:nvPicPr>
+        <p:blipFill>
+          <a:blip r:embed="rId9">
+            <a:extLst>
+              <a:ext uri="{BEBA8EAE-BF5A-486C-A8C5-ECC9F3942E4B}">
+                <a14:imgProps xmlns:a14="http://schemas.microsoft.com/office/drawing/2010/main">
+                  <a14:imgLayer r:embed="rId10">
+                    <a14:imgEffect>
+                      <a14:brightnessContrast contrast="40000"/>
+                    </a14:imgEffect>
+                  </a14:imgLayer>
+                </a14:imgProps>
+              </a:ext>
+              <a:ext uri="{28A0092B-C50C-407E-A947-70E740481C1C}">
+                <a14:useLocalDpi xmlns:a14="http://schemas.microsoft.com/office/drawing/2010/main" val="0"/>
+              </a:ext>
+            </a:extLst>
+          </a:blip>
+          <a:stretch>
+            <a:fillRect/>
+          </a:stretch>
+        </p:blipFill>
+        <p:spPr>
+          <a:xfrm>
+            <a:off x="8956674" y="5795963"/>
+            <a:ext cx="3101975" cy="828675"/>
+          </a:xfrm>
+          <a:prstGeom prst="rect">
+            <a:avLst/>
+          </a:prstGeom>
+        </p:spPr>
+      </p:pic>
     </p:spTree>
     <p:extLst>
       <p:ext uri="{BB962C8B-B14F-4D97-AF65-F5344CB8AC3E}">
@@ -8614,11 +8684,74 @@
             <p:ph idx="1"/>
           </p:nvPr>
         </p:nvSpPr>
-        <p:spPr/>
+        <p:spPr>
+          <a:xfrm>
+            <a:off x="4302617" y="2489273"/>
+            <a:ext cx="5897447" cy="3599316"/>
+          </a:xfrm>
+        </p:spPr>
         <p:txBody>
           <a:bodyPr/>
           <a:lstStyle/>
           <a:p>
+            <a:r>
+              <a:rPr lang="nl-BE" dirty="0"/>
+              <a:t>Titels</a:t>
+            </a:r>
+          </a:p>
+          <a:p>
+            <a:pPr lvl="1"/>
+            <a:r>
+              <a:rPr lang="nl-BE" dirty="0"/>
+              <a:t>Web Developer</a:t>
+            </a:r>
+          </a:p>
+          <a:p>
+            <a:pPr lvl="1"/>
+            <a:r>
+              <a:rPr lang="nl-BE" dirty="0"/>
+              <a:t>Java Developer</a:t>
+            </a:r>
+          </a:p>
+          <a:p>
+            <a:pPr lvl="1"/>
+            <a:r>
+              <a:rPr lang="nl-BE" dirty="0"/>
+              <a:t>Solution IT Architect</a:t>
+            </a:r>
+          </a:p>
+          <a:p>
+            <a:pPr lvl="1"/>
+            <a:r>
+              <a:rPr lang="nl-BE" dirty="0"/>
+              <a:t>Business Development Manager in AI</a:t>
+            </a:r>
+          </a:p>
+          <a:p>
+            <a:pPr lvl="1"/>
+            <a:r>
+              <a:rPr lang="nl-BE" dirty="0"/>
+              <a:t>.NET Developer</a:t>
+            </a:r>
+          </a:p>
+          <a:p>
+            <a:pPr lvl="1"/>
+            <a:r>
+              <a:rPr lang="nl-BE" dirty="0"/>
+              <a:t>FPM/UI5 Developer</a:t>
+            </a:r>
+          </a:p>
+          <a:p>
+            <a:pPr lvl="1"/>
+            <a:r>
+              <a:rPr lang="nl-BE" dirty="0"/>
+              <a:t>Project Manager</a:t>
+            </a:r>
+          </a:p>
+          <a:p>
+            <a:pPr marL="457200" lvl="1" indent="0">
+              <a:buNone/>
+            </a:pPr>
             <a:endParaRPr lang="nl-BE" dirty="0"/>
           </a:p>
         </p:txBody>
@@ -8653,6 +8786,329 @@
           <a:xfrm>
             <a:off x="10756158" y="647699"/>
             <a:ext cx="1302491" cy="1302491"/>
+          </a:xfrm>
+          <a:prstGeom prst="rect">
+            <a:avLst/>
+          </a:prstGeom>
+        </p:spPr>
+      </p:pic>
+      <p:sp>
+        <p:nvSpPr>
+          <p:cNvPr id="4" name="Tijdelijke aanduiding voor inhoud 2">
+            <a:extLst>
+              <a:ext uri="{FF2B5EF4-FFF2-40B4-BE49-F238E27FC236}">
+                <a16:creationId xmlns:a16="http://schemas.microsoft.com/office/drawing/2014/main" id="{5DFC6549-2A15-BE05-CBD6-D8578CCAA781}"/>
+              </a:ext>
+            </a:extLst>
+          </p:cNvPr>
+          <p:cNvSpPr txBox="1">
+            <a:spLocks/>
+          </p:cNvSpPr>
+          <p:nvPr/>
+        </p:nvSpPr>
+        <p:spPr>
+          <a:xfrm>
+            <a:off x="832721" y="2489273"/>
+            <a:ext cx="4660029" cy="3599316"/>
+          </a:xfrm>
+          <a:prstGeom prst="rect">
+            <a:avLst/>
+          </a:prstGeom>
+        </p:spPr>
+        <p:txBody>
+          <a:bodyPr vert="horz" lIns="91440" tIns="45720" rIns="91440" bIns="45720" rtlCol="0">
+            <a:normAutofit/>
+          </a:bodyPr>
+          <a:lstStyle>
+            <a:lvl1pPr marL="228600" indent="-228600" algn="l" defTabSz="914400" rtl="0" eaLnBrk="1" latinLnBrk="0" hangingPunct="1">
+              <a:lnSpc>
+                <a:spcPct val="90000"/>
+              </a:lnSpc>
+              <a:spcBef>
+                <a:spcPts val="1000"/>
+              </a:spcBef>
+              <a:buFont typeface="Arial" panose="020B0604020202020204" pitchFamily="34" charset="0"/>
+              <a:buChar char="•"/>
+              <a:defRPr sz="2400" kern="1200">
+                <a:solidFill>
+                  <a:schemeClr val="tx1"/>
+                </a:solidFill>
+                <a:latin typeface="+mn-lt"/>
+                <a:ea typeface="+mn-ea"/>
+                <a:cs typeface="+mn-cs"/>
+              </a:defRPr>
+            </a:lvl1pPr>
+            <a:lvl2pPr marL="685800" indent="-228600" algn="l" defTabSz="914400" rtl="0" eaLnBrk="1" latinLnBrk="0" hangingPunct="1">
+              <a:lnSpc>
+                <a:spcPct val="90000"/>
+              </a:lnSpc>
+              <a:spcBef>
+                <a:spcPts val="500"/>
+              </a:spcBef>
+              <a:buFont typeface="Arial" panose="020B0604020202020204" pitchFamily="34" charset="0"/>
+              <a:buChar char="•"/>
+              <a:defRPr sz="2000" kern="1200">
+                <a:solidFill>
+                  <a:schemeClr val="tx1"/>
+                </a:solidFill>
+                <a:latin typeface="+mn-lt"/>
+                <a:ea typeface="+mn-ea"/>
+                <a:cs typeface="+mn-cs"/>
+              </a:defRPr>
+            </a:lvl2pPr>
+            <a:lvl3pPr marL="1143000" indent="-228600" algn="l" defTabSz="914400" rtl="0" eaLnBrk="1" latinLnBrk="0" hangingPunct="1">
+              <a:lnSpc>
+                <a:spcPct val="90000"/>
+              </a:lnSpc>
+              <a:spcBef>
+                <a:spcPts val="500"/>
+              </a:spcBef>
+              <a:buFont typeface="Arial" panose="020B0604020202020204" pitchFamily="34" charset="0"/>
+              <a:buChar char="•"/>
+              <a:defRPr sz="1800" kern="1200">
+                <a:solidFill>
+                  <a:schemeClr val="tx1"/>
+                </a:solidFill>
+                <a:latin typeface="+mn-lt"/>
+                <a:ea typeface="+mn-ea"/>
+                <a:cs typeface="+mn-cs"/>
+              </a:defRPr>
+            </a:lvl3pPr>
+            <a:lvl4pPr marL="1600200" indent="-228600" algn="l" defTabSz="914400" rtl="0" eaLnBrk="1" latinLnBrk="0" hangingPunct="1">
+              <a:lnSpc>
+                <a:spcPct val="90000"/>
+              </a:lnSpc>
+              <a:spcBef>
+                <a:spcPts val="500"/>
+              </a:spcBef>
+              <a:buFont typeface="Arial" panose="020B0604020202020204" pitchFamily="34" charset="0"/>
+              <a:buChar char="•"/>
+              <a:defRPr sz="1600" kern="1200">
+                <a:solidFill>
+                  <a:schemeClr val="tx1"/>
+                </a:solidFill>
+                <a:latin typeface="+mn-lt"/>
+                <a:ea typeface="+mn-ea"/>
+                <a:cs typeface="+mn-cs"/>
+              </a:defRPr>
+            </a:lvl4pPr>
+            <a:lvl5pPr marL="2057400" indent="-228600" algn="l" defTabSz="914400" rtl="0" eaLnBrk="1" latinLnBrk="0" hangingPunct="1">
+              <a:lnSpc>
+                <a:spcPct val="90000"/>
+              </a:lnSpc>
+              <a:spcBef>
+                <a:spcPts val="500"/>
+              </a:spcBef>
+              <a:buFont typeface="Arial" panose="020B0604020202020204" pitchFamily="34" charset="0"/>
+              <a:buChar char="•"/>
+              <a:defRPr sz="1600" kern="1200">
+                <a:solidFill>
+                  <a:schemeClr val="tx1"/>
+                </a:solidFill>
+                <a:latin typeface="+mn-lt"/>
+                <a:ea typeface="+mn-ea"/>
+                <a:cs typeface="+mn-cs"/>
+              </a:defRPr>
+            </a:lvl5pPr>
+            <a:lvl6pPr marL="2514600" indent="-228600" algn="l" defTabSz="914400" rtl="0" eaLnBrk="1" latinLnBrk="0" hangingPunct="1">
+              <a:lnSpc>
+                <a:spcPct val="90000"/>
+              </a:lnSpc>
+              <a:spcBef>
+                <a:spcPts val="500"/>
+              </a:spcBef>
+              <a:buFont typeface="Arial" panose="020B0604020202020204" pitchFamily="34" charset="0"/>
+              <a:buChar char="•"/>
+              <a:defRPr sz="1400" kern="1200">
+                <a:solidFill>
+                  <a:schemeClr val="tx1"/>
+                </a:solidFill>
+                <a:latin typeface="+mn-lt"/>
+                <a:ea typeface="+mn-ea"/>
+                <a:cs typeface="+mn-cs"/>
+              </a:defRPr>
+            </a:lvl6pPr>
+            <a:lvl7pPr marL="2971800" indent="-228600" algn="l" defTabSz="914400" rtl="0" eaLnBrk="1" latinLnBrk="0" hangingPunct="1">
+              <a:lnSpc>
+                <a:spcPct val="90000"/>
+              </a:lnSpc>
+              <a:spcBef>
+                <a:spcPts val="500"/>
+              </a:spcBef>
+              <a:buFont typeface="Arial" panose="020B0604020202020204" pitchFamily="34" charset="0"/>
+              <a:buChar char="•"/>
+              <a:defRPr sz="1400" kern="1200">
+                <a:solidFill>
+                  <a:schemeClr val="tx1"/>
+                </a:solidFill>
+                <a:latin typeface="+mn-lt"/>
+                <a:ea typeface="+mn-ea"/>
+                <a:cs typeface="+mn-cs"/>
+              </a:defRPr>
+            </a:lvl7pPr>
+            <a:lvl8pPr marL="3429000" indent="-228600" algn="l" defTabSz="914400" rtl="0" eaLnBrk="1" latinLnBrk="0" hangingPunct="1">
+              <a:lnSpc>
+                <a:spcPct val="90000"/>
+              </a:lnSpc>
+              <a:spcBef>
+                <a:spcPts val="500"/>
+              </a:spcBef>
+              <a:buFont typeface="Arial" panose="020B0604020202020204" pitchFamily="34" charset="0"/>
+              <a:buChar char="•"/>
+              <a:defRPr sz="1400" kern="1200">
+                <a:solidFill>
+                  <a:schemeClr val="tx1"/>
+                </a:solidFill>
+                <a:latin typeface="+mn-lt"/>
+                <a:ea typeface="+mn-ea"/>
+                <a:cs typeface="+mn-cs"/>
+              </a:defRPr>
+            </a:lvl8pPr>
+            <a:lvl9pPr marL="3886200" indent="-228600" algn="l" defTabSz="914400" rtl="0" eaLnBrk="1" latinLnBrk="0" hangingPunct="1">
+              <a:lnSpc>
+                <a:spcPct val="90000"/>
+              </a:lnSpc>
+              <a:spcBef>
+                <a:spcPts val="500"/>
+              </a:spcBef>
+              <a:buFont typeface="Arial" panose="020B0604020202020204" pitchFamily="34" charset="0"/>
+              <a:buChar char="•"/>
+              <a:defRPr sz="1400" kern="1200">
+                <a:solidFill>
+                  <a:schemeClr val="tx1"/>
+                </a:solidFill>
+                <a:latin typeface="+mn-lt"/>
+                <a:ea typeface="+mn-ea"/>
+                <a:cs typeface="+mn-cs"/>
+              </a:defRPr>
+            </a:lvl9pPr>
+          </a:lstStyle>
+          <a:p>
+            <a:r>
+              <a:rPr lang="nl-BE"/>
+              <a:t>Bedrijven</a:t>
+            </a:r>
+          </a:p>
+          <a:p>
+            <a:pPr lvl="1"/>
+            <a:r>
+              <a:rPr lang="nl-BE"/>
+              <a:t>Cegeka</a:t>
+            </a:r>
+          </a:p>
+          <a:p>
+            <a:pPr lvl="1"/>
+            <a:r>
+              <a:rPr lang="nl-BE"/>
+              <a:t>ICTS KU Leuven</a:t>
+            </a:r>
+          </a:p>
+          <a:p>
+            <a:pPr lvl="1"/>
+            <a:r>
+              <a:rPr lang="nl-BE"/>
+              <a:t>KBC</a:t>
+            </a:r>
+          </a:p>
+          <a:p>
+            <a:pPr lvl="1"/>
+            <a:r>
+              <a:rPr lang="nl-BE"/>
+              <a:t>Colruyt Group</a:t>
+            </a:r>
+          </a:p>
+          <a:p>
+            <a:pPr lvl="1"/>
+            <a:r>
+              <a:rPr lang="nl-BE"/>
+              <a:t>Vlaamse Overheid</a:t>
+            </a:r>
+          </a:p>
+          <a:p>
+            <a:pPr lvl="1"/>
+            <a:r>
+              <a:rPr lang="nl-BE"/>
+              <a:t>Team4Talent</a:t>
+            </a:r>
+            <a:endParaRPr lang="nl-BE" dirty="0"/>
+          </a:p>
+        </p:txBody>
+      </p:sp>
+      <p:pic>
+        <p:nvPicPr>
+          <p:cNvPr id="6" name="Afbeelding 5" descr="Afbeelding met tekst&#10;&#10;Automatisch gegenereerde beschrijving">
+            <a:extLst>
+              <a:ext uri="{FF2B5EF4-FFF2-40B4-BE49-F238E27FC236}">
+                <a16:creationId xmlns:a16="http://schemas.microsoft.com/office/drawing/2014/main" id="{38B588C7-3274-AC62-8051-B604E1ED8D1A}"/>
+              </a:ext>
+            </a:extLst>
+          </p:cNvPr>
+          <p:cNvPicPr>
+            <a:picLocks noChangeAspect="1"/>
+          </p:cNvPicPr>
+          <p:nvPr/>
+        </p:nvPicPr>
+        <p:blipFill>
+          <a:blip r:embed="rId3">
+            <a:extLst>
+              <a:ext uri="{28A0092B-C50C-407E-A947-70E740481C1C}">
+                <a14:useLocalDpi xmlns:a14="http://schemas.microsoft.com/office/drawing/2010/main" val="0"/>
+              </a:ext>
+            </a:extLst>
+          </a:blip>
+          <a:stretch>
+            <a:fillRect/>
+          </a:stretch>
+        </p:blipFill>
+        <p:spPr>
+          <a:xfrm>
+            <a:off x="9011257" y="4690723"/>
+            <a:ext cx="2571986" cy="1278277"/>
+          </a:xfrm>
+          <a:prstGeom prst="rect">
+            <a:avLst/>
+          </a:prstGeom>
+        </p:spPr>
+      </p:pic>
+      <p:pic>
+        <p:nvPicPr>
+          <p:cNvPr id="7" name="Afbeelding 6" descr="Afbeelding met tekst&#10;&#10;Automatisch gegenereerde beschrijving">
+            <a:extLst>
+              <a:ext uri="{FF2B5EF4-FFF2-40B4-BE49-F238E27FC236}">
+                <a16:creationId xmlns:a16="http://schemas.microsoft.com/office/drawing/2014/main" id="{3D4D092B-F51E-DB3D-B5A8-A3210E0B8572}"/>
+              </a:ext>
+            </a:extLst>
+          </p:cNvPr>
+          <p:cNvPicPr>
+            <a:picLocks noChangeAspect="1"/>
+          </p:cNvPicPr>
+          <p:nvPr/>
+        </p:nvPicPr>
+        <p:blipFill>
+          <a:blip r:embed="rId4">
+            <a:extLst>
+              <a:ext uri="{BEBA8EAE-BF5A-486C-A8C5-ECC9F3942E4B}">
+                <a14:imgProps xmlns:a14="http://schemas.microsoft.com/office/drawing/2010/main">
+                  <a14:imgLayer r:embed="rId5">
+                    <a14:imgEffect>
+                      <a14:brightnessContrast bright="-40000" contrast="40000"/>
+                    </a14:imgEffect>
+                  </a14:imgLayer>
+                </a14:imgProps>
+              </a:ext>
+              <a:ext uri="{28A0092B-C50C-407E-A947-70E740481C1C}">
+                <a14:useLocalDpi xmlns:a14="http://schemas.microsoft.com/office/drawing/2010/main" val="0"/>
+              </a:ext>
+            </a:extLst>
+          </a:blip>
+          <a:stretch>
+            <a:fillRect/>
+          </a:stretch>
+        </p:blipFill>
+        <p:spPr>
+          <a:xfrm>
+            <a:off x="9011257" y="2637048"/>
+            <a:ext cx="2565849" cy="1159233"/>
           </a:xfrm>
           <a:prstGeom prst="rect">
             <a:avLst/>
@@ -9145,7 +9601,7 @@
           <a:lstStyle/>
           <a:p>
             <a:r>
-              <a:rPr lang="nl-BE" sz="6600" dirty="0"/>
+              <a:rPr lang="nl-BE" dirty="0"/>
               <a:t>EINDE</a:t>
             </a:r>
           </a:p>
@@ -9184,6 +9640,143 @@
             <a:r>
               <a:rPr lang="nl-BE" dirty="0"/>
               <a:t> voor het luisteren</a:t>
+            </a:r>
+          </a:p>
+        </p:txBody>
+      </p:sp>
+      <p:sp>
+        <p:nvSpPr>
+          <p:cNvPr id="4" name="Tekstvak 3">
+            <a:extLst>
+              <a:ext uri="{FF2B5EF4-FFF2-40B4-BE49-F238E27FC236}">
+                <a16:creationId xmlns:a16="http://schemas.microsoft.com/office/drawing/2014/main" id="{ECD09D1E-11D6-8030-4CDD-888E233081A5}"/>
+              </a:ext>
+            </a:extLst>
+          </p:cNvPr>
+          <p:cNvSpPr txBox="1"/>
+          <p:nvPr/>
+        </p:nvSpPr>
+        <p:spPr>
+          <a:xfrm>
+            <a:off x="9097397" y="2647949"/>
+            <a:ext cx="1771650" cy="1600438"/>
+          </a:xfrm>
+          <a:prstGeom prst="rect">
+            <a:avLst/>
+          </a:prstGeom>
+          <a:noFill/>
+        </p:spPr>
+        <p:txBody>
+          <a:bodyPr wrap="square" rtlCol="0">
+            <a:spAutoFit/>
+          </a:bodyPr>
+          <a:lstStyle/>
+          <a:p>
+            <a:r>
+              <a:rPr lang="en-US" sz="1400" dirty="0"/>
+              <a:t>Ben Blondeel</a:t>
+            </a:r>
+          </a:p>
+          <a:p>
+            <a:r>
+              <a:rPr lang="en-US" sz="1400" dirty="0"/>
+              <a:t>Joeri De Belder</a:t>
+            </a:r>
+          </a:p>
+          <a:p>
+            <a:r>
+              <a:rPr lang="en-US" sz="1400" dirty="0"/>
+              <a:t>Robby Gr</a:t>
+            </a:r>
+            <a:r>
+              <a:rPr lang="nl-NL" sz="1400" dirty="0"/>
+              <a:t>â</a:t>
+            </a:r>
+            <a:r>
+              <a:rPr lang="en-US" sz="1400" dirty="0" err="1"/>
+              <a:t>ces</a:t>
+            </a:r>
+            <a:endParaRPr lang="en-US" sz="1400" dirty="0"/>
+          </a:p>
+          <a:p>
+            <a:r>
+              <a:rPr lang="en-US" sz="1400" dirty="0"/>
+              <a:t>Volkert Brusche</a:t>
+            </a:r>
+          </a:p>
+          <a:p>
+            <a:r>
+              <a:rPr lang="en-US" sz="1400" dirty="0"/>
+              <a:t>Lowie Vandezande</a:t>
+            </a:r>
+          </a:p>
+          <a:p>
+            <a:r>
+              <a:rPr lang="en-US" sz="1400" dirty="0"/>
+              <a:t>Jef Vandezande</a:t>
+            </a:r>
+          </a:p>
+          <a:p>
+            <a:r>
+              <a:rPr lang="en-US" sz="1400" dirty="0"/>
+              <a:t>Arman Macuncu</a:t>
+            </a:r>
+          </a:p>
+        </p:txBody>
+      </p:sp>
+      <p:sp>
+        <p:nvSpPr>
+          <p:cNvPr id="5" name="Tekstvak 4">
+            <a:extLst>
+              <a:ext uri="{FF2B5EF4-FFF2-40B4-BE49-F238E27FC236}">
+                <a16:creationId xmlns:a16="http://schemas.microsoft.com/office/drawing/2014/main" id="{4B9EBD72-8C6A-ED5D-6E86-520FF75039A0}"/>
+              </a:ext>
+            </a:extLst>
+          </p:cNvPr>
+          <p:cNvSpPr txBox="1"/>
+          <p:nvPr/>
+        </p:nvSpPr>
+        <p:spPr>
+          <a:xfrm>
+            <a:off x="10642600" y="2647949"/>
+            <a:ext cx="1631950" cy="738664"/>
+          </a:xfrm>
+          <a:prstGeom prst="rect">
+            <a:avLst/>
+          </a:prstGeom>
+          <a:noFill/>
+        </p:spPr>
+        <p:txBody>
+          <a:bodyPr wrap="square" rtlCol="0">
+            <a:spAutoFit/>
+          </a:bodyPr>
+          <a:lstStyle/>
+          <a:p>
+            <a:r>
+              <a:rPr lang="en-US" sz="1400" dirty="0" err="1"/>
+              <a:t>Bastiaan</a:t>
+            </a:r>
+            <a:r>
+              <a:rPr lang="en-US" sz="1400" dirty="0"/>
+              <a:t> </a:t>
+            </a:r>
+            <a:r>
+              <a:rPr lang="en-US" sz="1400" dirty="0" err="1"/>
+              <a:t>Aardema</a:t>
+            </a:r>
+            <a:endParaRPr lang="en-US" sz="1400" dirty="0"/>
+          </a:p>
+          <a:p>
+            <a:r>
+              <a:rPr lang="en-US" sz="1400" dirty="0" err="1"/>
+              <a:t>Gis</a:t>
+            </a:r>
+            <a:endParaRPr lang="en-US" sz="1400" dirty="0"/>
+          </a:p>
+          <a:p>
+            <a:r>
+              <a:rPr lang="en-US" sz="1400" dirty="0"/>
+              <a:t>Abe</a:t>
             </a:r>
           </a:p>
         </p:txBody>

</xml_diff>

<commit_message>
Added Robby's perspective to the report
</commit_message>
<xml_diff>
--- a/Groep-21_Presentatie.pptx
+++ b/Groep-21_Presentatie.pptx
@@ -394,7 +394,7 @@
           <a:p>
             <a:fld id="{6D86DAEC-DC0F-4D08-909B-E4E2116F45D8}" type="datetimeFigureOut">
               <a:rPr lang="en-BE" smtClean="0"/>
-              <a:t>04/21/2023</a:t>
+              <a:t>04/23/2023</a:t>
             </a:fld>
             <a:endParaRPr lang="en-BE"/>
           </a:p>
@@ -808,7 +808,7 @@
           <a:p>
             <a:fld id="{6D86DAEC-DC0F-4D08-909B-E4E2116F45D8}" type="datetimeFigureOut">
               <a:rPr lang="en-BE" smtClean="0"/>
-              <a:t>04/21/2023</a:t>
+              <a:t>04/23/2023</a:t>
             </a:fld>
             <a:endParaRPr lang="en-BE"/>
           </a:p>
@@ -1144,7 +1144,7 @@
           <a:p>
             <a:fld id="{6D86DAEC-DC0F-4D08-909B-E4E2116F45D8}" type="datetimeFigureOut">
               <a:rPr lang="en-BE" smtClean="0"/>
-              <a:t>04/21/2023</a:t>
+              <a:t>04/23/2023</a:t>
             </a:fld>
             <a:endParaRPr lang="en-BE"/>
           </a:p>
@@ -1549,7 +1549,7 @@
           <a:p>
             <a:fld id="{6D86DAEC-DC0F-4D08-909B-E4E2116F45D8}" type="datetimeFigureOut">
               <a:rPr lang="en-BE" smtClean="0"/>
-              <a:t>04/21/2023</a:t>
+              <a:t>04/23/2023</a:t>
             </a:fld>
             <a:endParaRPr lang="en-BE"/>
           </a:p>
@@ -2117,7 +2117,7 @@
           <a:p>
             <a:fld id="{6D86DAEC-DC0F-4D08-909B-E4E2116F45D8}" type="datetimeFigureOut">
               <a:rPr lang="en-BE" smtClean="0"/>
-              <a:t>04/21/2023</a:t>
+              <a:t>04/23/2023</a:t>
             </a:fld>
             <a:endParaRPr lang="en-BE"/>
           </a:p>
@@ -2798,7 +2798,7 @@
           <a:p>
             <a:fld id="{6D86DAEC-DC0F-4D08-909B-E4E2116F45D8}" type="datetimeFigureOut">
               <a:rPr lang="en-BE" smtClean="0"/>
-              <a:t>04/21/2023</a:t>
+              <a:t>04/23/2023</a:t>
             </a:fld>
             <a:endParaRPr lang="en-BE"/>
           </a:p>
@@ -3711,7 +3711,7 @@
           <a:p>
             <a:fld id="{6D86DAEC-DC0F-4D08-909B-E4E2116F45D8}" type="datetimeFigureOut">
               <a:rPr lang="en-BE" smtClean="0"/>
-              <a:t>04/21/2023</a:t>
+              <a:t>04/23/2023</a:t>
             </a:fld>
             <a:endParaRPr lang="en-BE"/>
           </a:p>
@@ -4024,7 +4024,7 @@
           <a:p>
             <a:fld id="{6D86DAEC-DC0F-4D08-909B-E4E2116F45D8}" type="datetimeFigureOut">
               <a:rPr lang="en-BE" smtClean="0"/>
-              <a:t>04/21/2023</a:t>
+              <a:t>04/23/2023</a:t>
             </a:fld>
             <a:endParaRPr lang="en-BE"/>
           </a:p>
@@ -4288,7 +4288,7 @@
           <a:p>
             <a:fld id="{6D86DAEC-DC0F-4D08-909B-E4E2116F45D8}" type="datetimeFigureOut">
               <a:rPr lang="en-BE" smtClean="0"/>
-              <a:t>04/21/2023</a:t>
+              <a:t>04/23/2023</a:t>
             </a:fld>
             <a:endParaRPr lang="en-BE"/>
           </a:p>
@@ -4611,7 +4611,7 @@
           <a:p>
             <a:fld id="{6D86DAEC-DC0F-4D08-909B-E4E2116F45D8}" type="datetimeFigureOut">
               <a:rPr lang="en-BE" smtClean="0"/>
-              <a:t>04/21/2023</a:t>
+              <a:t>04/23/2023</a:t>
             </a:fld>
             <a:endParaRPr lang="en-BE"/>
           </a:p>
@@ -5000,7 +5000,7 @@
           <a:p>
             <a:fld id="{6D86DAEC-DC0F-4D08-909B-E4E2116F45D8}" type="datetimeFigureOut">
               <a:rPr lang="en-BE" smtClean="0"/>
-              <a:t>04/21/2023</a:t>
+              <a:t>04/23/2023</a:t>
             </a:fld>
             <a:endParaRPr lang="en-BE"/>
           </a:p>
@@ -5376,7 +5376,7 @@
           <a:p>
             <a:fld id="{6D86DAEC-DC0F-4D08-909B-E4E2116F45D8}" type="datetimeFigureOut">
               <a:rPr lang="en-BE" smtClean="0"/>
-              <a:t>04/21/2023</a:t>
+              <a:t>04/23/2023</a:t>
             </a:fld>
             <a:endParaRPr lang="en-BE"/>
           </a:p>
@@ -5882,7 +5882,7 @@
           <a:p>
             <a:fld id="{6D86DAEC-DC0F-4D08-909B-E4E2116F45D8}" type="datetimeFigureOut">
               <a:rPr lang="en-BE" smtClean="0"/>
-              <a:t>04/21/2023</a:t>
+              <a:t>04/23/2023</a:t>
             </a:fld>
             <a:endParaRPr lang="en-BE"/>
           </a:p>
@@ -6139,7 +6139,7 @@
           <a:p>
             <a:fld id="{6D86DAEC-DC0F-4D08-909B-E4E2116F45D8}" type="datetimeFigureOut">
               <a:rPr lang="en-BE" smtClean="0"/>
-              <a:t>04/21/2023</a:t>
+              <a:t>04/23/2023</a:t>
             </a:fld>
             <a:endParaRPr lang="en-BE"/>
           </a:p>
@@ -6302,7 +6302,7 @@
           <a:p>
             <a:fld id="{6D86DAEC-DC0F-4D08-909B-E4E2116F45D8}" type="datetimeFigureOut">
               <a:rPr lang="en-BE" smtClean="0"/>
-              <a:t>04/21/2023</a:t>
+              <a:t>04/23/2023</a:t>
             </a:fld>
             <a:endParaRPr lang="en-BE"/>
           </a:p>
@@ -6692,7 +6692,7 @@
           <a:p>
             <a:fld id="{6D86DAEC-DC0F-4D08-909B-E4E2116F45D8}" type="datetimeFigureOut">
               <a:rPr lang="en-BE" smtClean="0"/>
-              <a:t>04/21/2023</a:t>
+              <a:t>04/23/2023</a:t>
             </a:fld>
             <a:endParaRPr lang="en-BE"/>
           </a:p>
@@ -7101,7 +7101,7 @@
           <a:p>
             <a:fld id="{6D86DAEC-DC0F-4D08-909B-E4E2116F45D8}" type="datetimeFigureOut">
               <a:rPr lang="en-BE" smtClean="0"/>
-              <a:t>04/21/2023</a:t>
+              <a:t>04/23/2023</a:t>
             </a:fld>
             <a:endParaRPr lang="en-BE"/>
           </a:p>
@@ -7345,7 +7345,7 @@
           <a:p>
             <a:fld id="{6D86DAEC-DC0F-4D08-909B-E4E2116F45D8}" type="datetimeFigureOut">
               <a:rPr lang="en-BE" smtClean="0"/>
-              <a:t>04/21/2023</a:t>
+              <a:t>04/23/2023</a:t>
             </a:fld>
             <a:endParaRPr lang="en-BE"/>
           </a:p>

</xml_diff>